<commit_message>
Small updates to SAT Advanced for clarify. Also fixed missing lines in spatial partition intro.
</commit_message>
<xml_diff>
--- a/CS350/SAT_Advanced.pptx
+++ b/CS350/SAT_Advanced.pptx
@@ -244,7 +244,7 @@
           <a:p>
             <a:fld id="{53C9F55E-86C8-40C3-B143-2DF90D0BE23C}" type="datetimeFigureOut">
               <a:rPr lang="en-US" smtClean="0"/>
-              <a:t>6/20/2018</a:t>
+              <a:t>12/3/2018</a:t>
             </a:fld>
             <a:endParaRPr lang="en-US"/>
           </a:p>
@@ -640,16 +640,73 @@
           <a:bodyPr/>
           <a:lstStyle/>
           <a:p>
+            <a:pPr marL="0" marR="0" indent="0" algn="l" defTabSz="914400" rtl="0" eaLnBrk="1" fontAlgn="auto" latinLnBrk="0" hangingPunct="1">
+              <a:lnSpc>
+                <a:spcPct val="100000"/>
+              </a:lnSpc>
+              <a:spcBef>
+                <a:spcPts val="0"/>
+              </a:spcBef>
+              <a:spcAft>
+                <a:spcPts val="0"/>
+              </a:spcAft>
+              <a:buClrTx/>
+              <a:buSzTx/>
+              <a:buFontTx/>
+              <a:buNone/>
+              <a:tabLst/>
+              <a:defRPr/>
+            </a:pPr>
             <a:r>
               <a:rPr lang="en-US" dirty="0" smtClean="0"/>
               <a:t>The third</a:t>
             </a:r>
             <a:r>
               <a:rPr lang="en-US" baseline="0" dirty="0" smtClean="0"/>
-              <a:t> and last of the simple optimizations is also temporal coherence, although in this case it’s temporal coherence for intersection instead of separation. The basic idea is that if we had a contact normal last frame, that this is likely the same contact normal for this frame. We can completely skip calling SAT and jump straight to trying to build the contact manifold. It’s only if this fails that we then fallback to calling SAT again.</a:t>
-            </a:r>
-          </a:p>
-          <a:p>
+              <a:t> and last of the simple optimizations is also temporal coherence, although in this case it’s temporal coherence for intersection instead of separation. </a:t>
+            </a:r>
+            <a:r>
+              <a:rPr lang="en-US" baseline="0" dirty="0" smtClean="0"/>
+              <a:t>This is the optimization I’m least familiar with but the idea is fairly simple:</a:t>
+            </a:r>
+          </a:p>
+          <a:p>
+            <a:r>
+              <a:rPr lang="en-US" baseline="0" dirty="0" smtClean="0"/>
+              <a:t>If two objects were in contact last frame on an axis, it’s very likely that axis is still the best axis.</a:t>
+            </a:r>
+          </a:p>
+          <a:p>
+            <a:endParaRPr lang="en-US" baseline="0" dirty="0" smtClean="0"/>
+          </a:p>
+          <a:p>
+            <a:r>
+              <a:rPr lang="en-US" baseline="0" dirty="0" smtClean="0"/>
+              <a:t>This of course isn’t 100% true so the question is how do we detect failure. This is achieved by storing the relative orientation between the two objects. If the relative orientation isn’t substantially different from last frame then the same features should be in in contact unless one of two things happen:</a:t>
+            </a:r>
+          </a:p>
+          <a:p>
+            <a:pPr marL="228600" indent="-228600">
+              <a:buAutoNum type="arabicPeriod"/>
+            </a:pPr>
+            <a:r>
+              <a:rPr lang="en-US" baseline="0" dirty="0" smtClean="0"/>
+              <a:t>The features separated. In this case we’d detect that this axis now has separation and SAT can return false.</a:t>
+            </a:r>
+          </a:p>
+          <a:p>
+            <a:pPr marL="228600" indent="-228600">
+              <a:buAutoNum type="arabicPeriod"/>
+            </a:pPr>
+            <a:r>
+              <a:rPr lang="en-US" baseline="0" dirty="0" smtClean="0"/>
+              <a:t>The orientations stayed the same but the objects slid apart. In this case when we re-run clipping we should get an empty contact manifold. This would signify that the axis is no longer valid and we have to re-run the full SAT test.</a:t>
+            </a:r>
+          </a:p>
+          <a:p>
+            <a:pPr marL="228600" indent="-228600">
+              <a:buAutoNum type="arabicPeriod"/>
+            </a:pPr>
             <a:endParaRPr lang="en-US" baseline="0" dirty="0" smtClean="0"/>
           </a:p>
           <a:p>
@@ -726,8 +783,8 @@
         </p:nvSpPr>
         <p:spPr/>
       </p:sp>
-      <mc:AlternateContent xmlns:mc="http://schemas.openxmlformats.org/markup-compatibility/2006">
-        <mc:Choice xmlns:a14="http://schemas.microsoft.com/office/drawing/2010/main" Requires="a14">
+      <mc:AlternateContent xmlns:mc="http://schemas.openxmlformats.org/markup-compatibility/2006" xmlns:a14="http://schemas.microsoft.com/office/drawing/2010/main">
+        <mc:Choice Requires="a14">
           <p:sp>
             <p:nvSpPr>
               <p:cNvPr id="3" name="Notes Placeholder 2"/>
@@ -749,11 +806,7 @@
                 </a:r>
                 <a:r>
                   <a:rPr lang="en-US" baseline="0" dirty="0" smtClean="0"/>
-                  <a:t>bigger </a:t>
-                </a:r>
-                <a:r>
-                  <a:rPr lang="en-US" baseline="0" dirty="0" smtClean="0"/>
-                  <a:t>optimizations. The first big one is to undo everything I talked about previously and convert SAT back into HST. </a:t>
+                  <a:t>bigger optimizations. The first big one is to undo everything I talked about previously and convert SAT back into HST. </a:t>
                 </a:r>
               </a:p>
               <a:p>
@@ -762,11 +815,7 @@
               <a:p>
                 <a:r>
                   <a:rPr lang="en-US" baseline="0" dirty="0" smtClean="0"/>
-                  <a:t>Remember the core difference between SAT and HST is that SAT tests axes and HST tests planes. </a:t>
-                </a:r>
-                <a:r>
-                  <a:rPr lang="en-US" baseline="0" dirty="0" smtClean="0"/>
-                  <a:t>However if we take a second to think we’ll realize that there’s guaranteed to be the same or less axes than there are planes (think </a:t>
+                  <a:t>Remember the core difference between SAT and HST is that SAT tests axes and HST tests planes. However if we take a second to think we’ll realize that there’s guaranteed to be the same or less axes than there are planes (think </a:t>
                 </a:r>
                 <a:r>
                   <a:rPr lang="en-US" baseline="0" dirty="0" err="1" smtClean="0"/>
@@ -813,7 +862,7 @@
             </p:txBody>
           </p:sp>
         </mc:Choice>
-        <mc:Fallback>
+        <mc:Fallback xmlns="">
           <p:sp>
             <p:nvSpPr>
               <p:cNvPr id="3" name="Notes Placeholder 2"/>
@@ -973,31 +1022,7 @@
           <a:p>
             <a:r>
               <a:rPr lang="en-US" baseline="0" dirty="0" smtClean="0"/>
-              <a:t>If you recall, to test one axis we needed the projection of each shape. Each shape’s projection was computed </a:t>
-            </a:r>
-            <a:r>
-              <a:rPr lang="en-US" baseline="0" dirty="0" smtClean="0"/>
-              <a:t>from two calls to its support function; one in the axis direction, the other in the negative axis direction. This </a:t>
-            </a:r>
-            <a:r>
-              <a:rPr lang="en-US" baseline="0" dirty="0" smtClean="0"/>
-              <a:t>means a total of 4 support function calls </a:t>
-            </a:r>
-            <a:r>
-              <a:rPr lang="en-US" baseline="0" dirty="0" smtClean="0"/>
-              <a:t>are needed to </a:t>
-            </a:r>
-            <a:r>
-              <a:rPr lang="en-US" baseline="0" dirty="0" smtClean="0"/>
-              <a:t>test one axis in SAT. For more general convex shapes, a support function is </a:t>
-            </a:r>
-            <a:r>
-              <a:rPr lang="en-US" baseline="0" dirty="0" smtClean="0"/>
-              <a:t>will walk all vertices so this will be very expensive</a:t>
-            </a:r>
-            <a:r>
-              <a:rPr lang="en-US" baseline="0" dirty="0" smtClean="0"/>
-              <a:t>!</a:t>
+              <a:t>If you recall, to test one axis we needed the projection of each shape. Each shape’s projection was computed from two calls to its support function; one in the axis direction, the other in the negative axis direction. This means a total of 4 support function calls are needed to test one axis in SAT. For more general convex shapes, a support function is will walk all vertices so this will be very expensive!</a:t>
             </a:r>
           </a:p>
           <a:p>
@@ -1014,15 +1039,7 @@
             </a:r>
             <a:r>
               <a:rPr lang="en-US" baseline="0" dirty="0" smtClean="0"/>
-              <a:t> (not edge vs. edge). If we take a step in and look at the problem a little less </a:t>
-            </a:r>
-            <a:r>
-              <a:rPr lang="en-US" baseline="0" dirty="0" smtClean="0"/>
-              <a:t>abstractly </a:t>
-            </a:r>
-            <a:r>
-              <a:rPr lang="en-US" baseline="0" dirty="0" smtClean="0"/>
-              <a:t>we can get some useful insight, in particular let’s look at where this face normal comes from.</a:t>
+              <a:t> (not edge vs. edge). If we take a step in and look at the problem a little less abstractly we can get some useful insight, in particular let’s look at where this face normal comes from.</a:t>
             </a:r>
           </a:p>
           <a:p>
@@ -1246,7 +1263,6 @@
               <a:rPr lang="en-US" baseline="0" dirty="0" smtClean="0"/>
               <a:t>Note: after finishing this presentation it might seem like you could run this optimization on edges as long as you get a correct normal direction but it doesn’t work if you don’t use the gauss maps to skip axis.</a:t>
             </a:r>
-            <a:endParaRPr lang="en-US" baseline="0" dirty="0" smtClean="0"/>
           </a:p>
         </p:txBody>
       </p:sp>
@@ -1605,11 +1621,7 @@
             </a:pPr>
             <a:r>
               <a:rPr lang="en-US" baseline="0" dirty="0" smtClean="0"/>
-              <a:t>Since the Minkowski difference is convex, we could write a simple point in convex shape algorithm</a:t>
-            </a:r>
-            <a:r>
-              <a:rPr lang="en-US" baseline="0" dirty="0" smtClean="0"/>
-              <a:t>.</a:t>
+              <a:t>Since the Minkowski difference is convex, we could write a simple point in convex shape algorithm.</a:t>
             </a:r>
             <a:endParaRPr lang="en-US" dirty="0"/>
           </a:p>
@@ -1714,8 +1726,21 @@
             </a:pPr>
             <a:r>
               <a:rPr lang="en-US" baseline="0" dirty="0" smtClean="0"/>
-              <a:t>The easiest (but not fastest) point vs. convex mesh algorithm you could write is to simply test the point against all faces in the mesh. If the point is outside any face then it’s outside the mesh. It’s only if the point is inside all faces that the point is inside the mesh.</a:t>
-            </a:r>
+              <a:t>The easiest (but not fastest) point vs. convex mesh algorithm you could write is to simply test the point against all faces in the mesh. If the point is outside any face then it’s outside the mesh. It’s only if the point is inside all faces that the point is inside the mesh</a:t>
+            </a:r>
+            <a:r>
+              <a:rPr lang="en-US" baseline="0" dirty="0" smtClean="0"/>
+              <a:t>. (Remember, faces </a:t>
+            </a:r>
+            <a:r>
+              <a:rPr lang="en-US" baseline="0" dirty="0" err="1" smtClean="0"/>
+              <a:t>normals</a:t>
+            </a:r>
+            <a:r>
+              <a:rPr lang="en-US" baseline="0" dirty="0" smtClean="0"/>
+              <a:t> point outwards by convention so this tests for being on the positive side of a plane, not the negative).</a:t>
+            </a:r>
+            <a:endParaRPr lang="en-US" baseline="0" dirty="0" smtClean="0"/>
           </a:p>
           <a:p>
             <a:pPr marL="0" marR="0" lvl="0" indent="0" algn="l" defTabSz="914400" rtl="0" eaLnBrk="1" fontAlgn="auto" latinLnBrk="0" hangingPunct="1">
@@ -1866,7 +1891,6 @@
               <a:rPr lang="en-US" dirty="0" smtClean="0"/>
               <a:t>	</a:t>
             </a:r>
-            <a:endParaRPr lang="en-US" dirty="0" smtClean="0"/>
           </a:p>
         </p:txBody>
       </p:sp>
@@ -2172,11 +2196,7 @@
             </a:pPr>
             <a:r>
               <a:rPr lang="en-US" baseline="0" dirty="0" smtClean="0"/>
-              <a:t>It shouldn’t be hard to see that several of the faces come from </a:t>
-            </a:r>
-            <a:r>
-              <a:rPr lang="en-US" baseline="0" dirty="0" smtClean="0"/>
-              <a:t>a face on one of the original shapes.</a:t>
+              <a:t>It shouldn’t be hard to see that several of the faces come from a face on one of the original shapes.</a:t>
             </a:r>
             <a:endParaRPr lang="en-US" dirty="0"/>
           </a:p>
@@ -3129,15 +3149,7 @@
             </a:r>
             <a:r>
               <a:rPr lang="en-US" baseline="0" dirty="0" smtClean="0"/>
-              <a:t> Map. A gauss map is basically </a:t>
-            </a:r>
-            <a:r>
-              <a:rPr lang="en-US" baseline="0" dirty="0" smtClean="0"/>
-              <a:t>a different </a:t>
-            </a:r>
-            <a:r>
-              <a:rPr lang="en-US" baseline="0" dirty="0" smtClean="0"/>
-              <a:t>way to view the same data that can provide some useful insights (I’m no expert).</a:t>
+              <a:t> Map. A gauss map is basically a different way to view the same data that can provide some useful insights (I’m no expert).</a:t>
             </a:r>
           </a:p>
           <a:p>
@@ -3340,32 +3352,16 @@
             </a:r>
             <a:r>
               <a:rPr lang="en-US" baseline="0" dirty="0" smtClean="0"/>
-              <a:t> an algorithm is modern is always a bit odd, especially with content that is as of 2018 about </a:t>
-            </a:r>
+              <a:t> an algorithm is modern is always a bit odd, especially with content that is as of 2018 about 5 years old, however this is what is currently used in the industry. That being said, I want to give some basic numbers about when these updates came about.</a:t>
+            </a:r>
+          </a:p>
+          <a:p>
+            <a:endParaRPr lang="en-US" baseline="0" dirty="0" smtClean="0"/>
+          </a:p>
+          <a:p>
             <a:r>
               <a:rPr lang="en-US" baseline="0" dirty="0" smtClean="0"/>
-              <a:t>5 </a:t>
-            </a:r>
-            <a:r>
-              <a:rPr lang="en-US" baseline="0" dirty="0" smtClean="0"/>
-              <a:t>years old, however this is what is currently used in the industry. That being said, I want to give some basic numbers about when these updates came about.</a:t>
-            </a:r>
-          </a:p>
-          <a:p>
-            <a:endParaRPr lang="en-US" baseline="0" dirty="0" smtClean="0"/>
-          </a:p>
-          <a:p>
-            <a:r>
-              <a:rPr lang="en-US" baseline="0" dirty="0" smtClean="0"/>
-              <a:t>So a few random details, some of this I had to approximate after asking various sources. As near as I can tell, HST was credited to Hermann Minkowski who lived from 1864 to 1909. That being said, this algorithm probably wasn’t used in computational geometry until around 1980. GJK was first published in 1988. </a:t>
-            </a:r>
-            <a:r>
-              <a:rPr lang="en-US" baseline="0" dirty="0" smtClean="0"/>
-              <a:t>The </a:t>
-            </a:r>
-            <a:r>
-              <a:rPr lang="en-US" baseline="0" dirty="0" smtClean="0"/>
-              <a:t>first GDC talk of modern SAT was 2013, more than 20 years later!</a:t>
+              <a:t>So a few random details, some of this I had to approximate after asking various sources. As near as I can tell, HST was credited to Hermann Minkowski who lived from 1864 to 1909. That being said, this algorithm probably wasn’t used in computational geometry until around 1980. GJK was first published in 1988. The first GDC talk of modern SAT was 2013, more than 20 years later!</a:t>
             </a:r>
             <a:endParaRPr lang="en-US" dirty="0"/>
           </a:p>
@@ -3436,8 +3432,8 @@
         </p:nvSpPr>
         <p:spPr/>
       </p:sp>
-      <mc:AlternateContent xmlns:mc="http://schemas.openxmlformats.org/markup-compatibility/2006">
-        <mc:Choice xmlns:a14="http://schemas.microsoft.com/office/drawing/2010/main" Requires="a14">
+      <mc:AlternateContent xmlns:mc="http://schemas.openxmlformats.org/markup-compatibility/2006" xmlns:a14="http://schemas.microsoft.com/office/drawing/2010/main">
+        <mc:Choice Requires="a14">
           <p:sp>
             <p:nvSpPr>
               <p:cNvPr id="3" name="Notes Placeholder 2"/>
@@ -3459,11 +3455,7 @@
                 </a:r>
                 <a:r>
                   <a:rPr lang="en-US" baseline="0" dirty="0" smtClean="0"/>
-                  <a:t> help understand let’s look at the difference between the gauss map of the Minkowski </a:t>
-                </a:r>
-                <a:r>
-                  <a:rPr lang="en-US" baseline="0" dirty="0" smtClean="0"/>
-                  <a:t>difference (</a:t>
+                  <a:t> help understand let’s look at the difference between the gauss map of the Minkowski difference (</a:t>
                 </a:r>
                 <a14:m>
                   <m:oMath xmlns:m="http://schemas.openxmlformats.org/officeDocument/2006/math">
@@ -3506,15 +3498,7 @@
                 </a14:m>
                 <a:r>
                   <a:rPr lang="en-US" baseline="0" dirty="0" smtClean="0"/>
-                  <a:t>) </a:t>
-                </a:r>
-                <a:r>
-                  <a:rPr lang="en-US" baseline="0" dirty="0" smtClean="0"/>
-                  <a:t>and the gauss map </a:t>
-                </a:r>
-                <a:r>
-                  <a:rPr lang="en-US" baseline="0" dirty="0" smtClean="0"/>
-                  <a:t>of the two shapes (</a:t>
+                  <a:t>) and the gauss map of the two shapes (</a:t>
                 </a:r>
                 <a14:m>
                   <m:oMath xmlns:m="http://schemas.openxmlformats.org/officeDocument/2006/math">
@@ -3592,17 +3576,13 @@
               <a:p>
                 <a:r>
                   <a:rPr lang="en-US" baseline="0" dirty="0" smtClean="0"/>
-                  <a:t>Remember </a:t>
-                </a:r>
-                <a:r>
-                  <a:rPr lang="en-US" baseline="0" dirty="0" smtClean="0"/>
-                  <a:t>we need to test every point on the gauss map of the Minkowski difference.</a:t>
+                  <a:t>Remember we need to test every point on the gauss map of the Minkowski difference.</a:t>
                 </a:r>
               </a:p>
             </p:txBody>
           </p:sp>
         </mc:Choice>
-        <mc:Fallback>
+        <mc:Fallback xmlns="">
           <p:sp>
             <p:nvSpPr>
               <p:cNvPr id="3" name="Notes Placeholder 2"/>
@@ -3749,8 +3729,8 @@
         </p:nvSpPr>
         <p:spPr/>
       </p:sp>
-      <mc:AlternateContent xmlns:mc="http://schemas.openxmlformats.org/markup-compatibility/2006">
-        <mc:Choice xmlns:a14="http://schemas.microsoft.com/office/drawing/2010/main" Requires="a14">
+      <mc:AlternateContent xmlns:mc="http://schemas.openxmlformats.org/markup-compatibility/2006" xmlns:a14="http://schemas.microsoft.com/office/drawing/2010/main">
+        <mc:Choice Requires="a14">
           <p:sp>
             <p:nvSpPr>
               <p:cNvPr id="3" name="Notes Placeholder 2"/>
@@ -3792,7 +3772,7 @@
                     <m:d>
                       <m:dPr>
                         <m:ctrlPr>
-                          <a:rPr lang="en-US" b="0" i="0" baseline="0" smtClean="0">
+                          <a:rPr lang="en-US" b="0" i="1" baseline="0" smtClean="0">
                             <a:latin typeface="Cambria Math" panose="02040503050406030204" pitchFamily="18" charset="0"/>
                           </a:rPr>
                         </m:ctrlPr>
@@ -3848,11 +3828,7 @@
                 </a14:m>
                 <a:r>
                   <a:rPr lang="en-US" baseline="0" dirty="0" smtClean="0"/>
-                  <a:t>. </a:t>
-                </a:r>
-                <a:r>
-                  <a:rPr lang="en-US" baseline="0" dirty="0" smtClean="0"/>
-                  <a:t>It shouldn’t be a surprise that each of these map to vertices </a:t>
+                  <a:t>. It shouldn’t be a surprise that each of these map to vertices </a:t>
                 </a:r>
                 <a14:m>
                   <m:oMath xmlns:m="http://schemas.openxmlformats.org/officeDocument/2006/math">
@@ -3922,7 +3898,6 @@
                   <a:rPr lang="en-US" baseline="0" dirty="0" smtClean="0"/>
                   <a:t> difference. </a:t>
                 </a:r>
-                <a:endParaRPr lang="en-US" baseline="0" dirty="0" smtClean="0"/>
               </a:p>
               <a:p>
                 <a:endParaRPr lang="en-US" baseline="0" dirty="0" smtClean="0"/>
@@ -3930,11 +3905,7 @@
               <a:p>
                 <a:r>
                   <a:rPr lang="en-US" baseline="0" dirty="0" smtClean="0"/>
-                  <a:t>The question is where do all of the other vertices </a:t>
-                </a:r>
-                <a:r>
-                  <a:rPr lang="en-US" baseline="0" dirty="0" smtClean="0"/>
-                  <a:t>in </a:t>
+                  <a:t>The question is where do all of the other vertices in </a:t>
                 </a:r>
                 <a14:m>
                   <m:oMath xmlns:m="http://schemas.openxmlformats.org/officeDocument/2006/math">
@@ -3977,17 +3948,13 @@
                 </a14:m>
                 <a:r>
                   <a:rPr lang="en-US" baseline="0" dirty="0" smtClean="0"/>
-                  <a:t> come </a:t>
-                </a:r>
-                <a:r>
-                  <a:rPr lang="en-US" baseline="0" dirty="0" smtClean="0"/>
-                  <a:t>from?</a:t>
+                  <a:t> come from?</a:t>
                 </a:r>
               </a:p>
             </p:txBody>
           </p:sp>
         </mc:Choice>
-        <mc:Fallback>
+        <mc:Fallback xmlns="">
           <p:sp>
             <p:nvSpPr>
               <p:cNvPr id="3" name="Notes Placeholder 2"/>
@@ -4270,40 +4237,16 @@
             </a:r>
             <a:r>
               <a:rPr lang="en-US" baseline="0" dirty="0" smtClean="0"/>
-              <a:t> to a very important observation: Two edges only form </a:t>
-            </a:r>
+              <a:t> to a very important observation: Two edges only form a surface on the Minkowski difference (and hence actually need to be tested) if their corresponding great arcs intersect!</a:t>
+            </a:r>
+          </a:p>
+          <a:p>
+            <a:endParaRPr lang="en-US" baseline="0" dirty="0" smtClean="0"/>
+          </a:p>
+          <a:p>
             <a:r>
               <a:rPr lang="en-US" baseline="0" dirty="0" smtClean="0"/>
-              <a:t>a </a:t>
-            </a:r>
-            <a:r>
-              <a:rPr lang="en-US" baseline="0" dirty="0" smtClean="0"/>
-              <a:t>surface on the Minkowski difference (and hence actually need to be tested) if their corresponding great arcs intersect!</a:t>
-            </a:r>
-          </a:p>
-          <a:p>
-            <a:endParaRPr lang="en-US" baseline="0" dirty="0" smtClean="0"/>
-          </a:p>
-          <a:p>
-            <a:r>
-              <a:rPr lang="en-US" baseline="0" dirty="0" smtClean="0"/>
-              <a:t>The basic idea is that we only want to test edges that face towards each other. On the gauss </a:t>
-            </a:r>
-            <a:r>
-              <a:rPr lang="en-US" baseline="0" dirty="0" smtClean="0"/>
-              <a:t>map, </a:t>
-            </a:r>
-            <a:r>
-              <a:rPr lang="en-US" baseline="0" dirty="0" smtClean="0"/>
-              <a:t>an edge </a:t>
-            </a:r>
-            <a:r>
-              <a:rPr lang="en-US" baseline="0" dirty="0" smtClean="0"/>
-              <a:t>represents all of </a:t>
-            </a:r>
-            <a:r>
-              <a:rPr lang="en-US" baseline="0" dirty="0" smtClean="0"/>
-              <a:t>the </a:t>
+              <a:t>The basic idea is that we only want to test edges that face towards each other. On the gauss map, an edge represents all of the </a:t>
             </a:r>
             <a:r>
               <a:rPr lang="en-US" baseline="0" dirty="0" err="1" smtClean="0"/>
@@ -4311,27 +4254,7 @@
             </a:r>
             <a:r>
               <a:rPr lang="en-US" baseline="0" dirty="0" smtClean="0"/>
-              <a:t> </a:t>
-            </a:r>
-            <a:r>
-              <a:rPr lang="en-US" baseline="0" dirty="0" smtClean="0"/>
-              <a:t>between the two </a:t>
-            </a:r>
-            <a:r>
-              <a:rPr lang="en-US" baseline="0" dirty="0" smtClean="0"/>
-              <a:t>adjacent faces</a:t>
-            </a:r>
-            <a:r>
-              <a:rPr lang="en-US" baseline="0" dirty="0" smtClean="0"/>
-              <a:t>. So if the edges intersect (remember it’s –B) then the </a:t>
-            </a:r>
-            <a:r>
-              <a:rPr lang="en-US" baseline="0" dirty="0" smtClean="0"/>
-              <a:t>edges mostly </a:t>
-            </a:r>
-            <a:r>
-              <a:rPr lang="en-US" baseline="0" dirty="0" smtClean="0"/>
-              <a:t>point towards each other.</a:t>
+              <a:t> between the two adjacent faces. So if the edges intersect (remember it’s –B) then the edges mostly point towards each other.</a:t>
             </a:r>
           </a:p>
           <a:p>
@@ -5666,19 +5589,7 @@
                 </a:r>
                 <a:r>
                   <a:rPr lang="en-US" baseline="0" dirty="0" smtClean="0"/>
-                  <a:t> most of the edges with 3 simple comparisons. For </a:t>
-                </a:r>
-                <a:r>
-                  <a:rPr lang="en-US" baseline="0" dirty="0" smtClean="0"/>
-                  <a:t>the edges we still had to test we </a:t>
-                </a:r>
-                <a:r>
-                  <a:rPr lang="en-US" baseline="0" dirty="0" smtClean="0"/>
-                  <a:t>also removed all support function </a:t>
-                </a:r>
-                <a:r>
-                  <a:rPr lang="en-US" baseline="0" dirty="0" smtClean="0"/>
-                  <a:t>calls making the total edge test </a:t>
+                  <a:t> most of the edges with 3 simple comparisons. For the edges we still had to test we also removed all support function calls making the total edge test </a:t>
                 </a:r>
                 <a14:m>
                   <m:oMath xmlns:m="http://schemas.openxmlformats.org/officeDocument/2006/math">
@@ -5709,25 +5620,8 @@
                 </a14:m>
                 <a:r>
                   <a:rPr lang="en-US" baseline="0" dirty="0" smtClean="0"/>
-                  <a:t>. </a:t>
+                  <a:t>. So the complexity of SAT as a whole didn’t change but the cost of each operation becomes miniscule.</a:t>
                 </a:r>
-                <a:r>
-                  <a:rPr lang="en-US" baseline="0" dirty="0" smtClean="0"/>
-                  <a:t>So the complexity </a:t>
-                </a:r>
-                <a:r>
-                  <a:rPr lang="en-US" baseline="0" dirty="0" smtClean="0"/>
-                  <a:t>of SAT as a whole didn’t </a:t>
-                </a:r>
-                <a:r>
-                  <a:rPr lang="en-US" baseline="0" dirty="0" smtClean="0"/>
-                  <a:t>change but the cost of each operation becomes miniscule</a:t>
-                </a:r>
-                <a:r>
-                  <a:rPr lang="en-US" baseline="0" dirty="0" smtClean="0"/>
-                  <a:t>.</a:t>
-                </a:r>
-                <a:endParaRPr lang="en-US" baseline="0" dirty="0" smtClean="0"/>
               </a:p>
               <a:p>
                 <a:endParaRPr lang="en-US" baseline="0" dirty="0" smtClean="0"/>
@@ -6552,40 +6446,16 @@
             </a:r>
             <a:r>
               <a:rPr lang="en-US" baseline="0" dirty="0" smtClean="0"/>
-              <a:t> but not in the context of generic SAT. If you recall, SAT is an algorithm that tests for separation. If any axis of separation is found then you can immediately return false. So this means we </a:t>
-            </a:r>
+              <a:t> but not in the context of generic SAT. If you recall, SAT is an algorithm that tests for separation. If any axis of separation is found then you can immediately return false. So this means we can get lucky and terminate after only one axis test.</a:t>
+            </a:r>
+          </a:p>
+          <a:p>
+            <a:endParaRPr lang="en-US" baseline="0" dirty="0" smtClean="0"/>
+          </a:p>
+          <a:p>
             <a:r>
               <a:rPr lang="en-US" baseline="0" dirty="0" smtClean="0"/>
-              <a:t>can get </a:t>
-            </a:r>
-            <a:r>
-              <a:rPr lang="en-US" baseline="0" dirty="0" smtClean="0"/>
-              <a:t>lucky and terminate after only one axis test.</a:t>
-            </a:r>
-          </a:p>
-          <a:p>
-            <a:endParaRPr lang="en-US" baseline="0" dirty="0" smtClean="0"/>
-          </a:p>
-          <a:p>
-            <a:r>
-              <a:rPr lang="en-US" baseline="0" dirty="0" smtClean="0"/>
-              <a:t>If you think back, you’ll recall that we talked about temporal coherence with Frustum tests. Temporal coherence is the idea that objects don’t move much from frame-to-frame, so if an axis was separating last frame, then there’s a good </a:t>
-            </a:r>
-            <a:r>
-              <a:rPr lang="en-US" baseline="0" dirty="0" smtClean="0"/>
-              <a:t>chance </a:t>
-            </a:r>
-            <a:r>
-              <a:rPr lang="en-US" baseline="0" dirty="0" smtClean="0"/>
-              <a:t>it’s separating again this frame. This leads to a very easy optimization of caching the last axis of separation and simply starting with that axis again. With any </a:t>
-            </a:r>
-            <a:r>
-              <a:rPr lang="en-US" baseline="0" dirty="0" smtClean="0"/>
-              <a:t>luck, </a:t>
-            </a:r>
-            <a:r>
-              <a:rPr lang="en-US" baseline="0" dirty="0" smtClean="0"/>
-              <a:t>this means even when </a:t>
+              <a:t>If you think back, you’ll recall that we talked about temporal coherence with Frustum tests. Temporal coherence is the idea that objects don’t move much from frame-to-frame, so if an axis was separating last frame, then there’s a good chance it’s separating again this frame. This leads to a very easy optimization of caching the last axis of separation and simply starting with that axis again. With any luck, this means even when </a:t>
             </a:r>
             <a:r>
               <a:rPr lang="en-US" baseline="0" dirty="0" err="1" smtClean="0"/>
@@ -6593,15 +6463,7 @@
             </a:r>
             <a:r>
               <a:rPr lang="en-US" baseline="0" dirty="0" smtClean="0"/>
-              <a:t> fails that it’ll </a:t>
-            </a:r>
-            <a:r>
-              <a:rPr lang="en-US" baseline="0" dirty="0" smtClean="0"/>
-              <a:t>take only one </a:t>
-            </a:r>
-            <a:r>
-              <a:rPr lang="en-US" baseline="0" dirty="0" smtClean="0"/>
-              <a:t>axis check to return false.</a:t>
+              <a:t> fails that it’ll take only one axis check to return false.</a:t>
             </a:r>
             <a:endParaRPr lang="en-US" dirty="0"/>
           </a:p>
@@ -6774,7 +6636,7 @@
           <a:p>
             <a:fld id="{ECD19FB2-3AAB-4D03-B13A-2960828C78E3}" type="datetimeFigureOut">
               <a:rPr lang="en-US" smtClean="0"/>
-              <a:t>6/20/2018</a:t>
+              <a:t>12/3/2018</a:t>
             </a:fld>
             <a:endParaRPr lang="en-US" dirty="0"/>
           </a:p>
@@ -6950,7 +6812,7 @@
           <a:p>
             <a:fld id="{0DED02AE-B9A4-47BD-AF8E-97E16144138B}" type="datetimeFigureOut">
               <a:rPr lang="en-US" smtClean="0"/>
-              <a:t>6/20/2018</a:t>
+              <a:t>12/3/2018</a:t>
             </a:fld>
             <a:endParaRPr lang="en-US" dirty="0"/>
           </a:p>
@@ -7135,7 +6997,7 @@
           <a:p>
             <a:fld id="{CF0FD78B-DB02-4362-BCDC-98A55456977C}" type="datetimeFigureOut">
               <a:rPr lang="en-US" smtClean="0"/>
-              <a:t>6/20/2018</a:t>
+              <a:t>12/3/2018</a:t>
             </a:fld>
             <a:endParaRPr lang="en-US" dirty="0"/>
           </a:p>
@@ -7310,7 +7172,7 @@
           <a:p>
             <a:fld id="{99916976-5D93-46E4-A98A-FAD63E4D0EA8}" type="datetimeFigureOut">
               <a:rPr lang="en-US" smtClean="0"/>
-              <a:t>6/20/2018</a:t>
+              <a:t>12/3/2018</a:t>
             </a:fld>
             <a:endParaRPr lang="en-US" dirty="0"/>
           </a:p>
@@ -7561,7 +7423,7 @@
           <a:p>
             <a:fld id="{0F39F4F5-F4D2-4D2A-AB60-88D37ADCB869}" type="datetimeFigureOut">
               <a:rPr lang="en-US" smtClean="0"/>
-              <a:t>6/20/2018</a:t>
+              <a:t>12/3/2018</a:t>
             </a:fld>
             <a:endParaRPr lang="en-US" dirty="0"/>
           </a:p>
@@ -7798,7 +7660,7 @@
           <a:p>
             <a:fld id="{D23BC6CE-6D1E-47E5-8859-F31AC5380EB2}" type="datetimeFigureOut">
               <a:rPr lang="en-US" smtClean="0"/>
-              <a:t>6/20/2018</a:t>
+              <a:t>12/3/2018</a:t>
             </a:fld>
             <a:endParaRPr lang="en-US" dirty="0"/>
           </a:p>
@@ -8170,7 +8032,7 @@
           <a:p>
             <a:fld id="{B1B4E7C4-4DA4-404D-9965-B13F2DD7D8BF}" type="datetimeFigureOut">
               <a:rPr lang="en-US" smtClean="0"/>
-              <a:t>6/20/2018</a:t>
+              <a:t>12/3/2018</a:t>
             </a:fld>
             <a:endParaRPr lang="en-US" dirty="0"/>
           </a:p>
@@ -8293,7 +8155,7 @@
           <a:p>
             <a:fld id="{476FB7AA-4A53-424F-AD41-70827B6504BA}" type="datetimeFigureOut">
               <a:rPr lang="en-US" smtClean="0"/>
-              <a:t>6/20/2018</a:t>
+              <a:t>12/3/2018</a:t>
             </a:fld>
             <a:endParaRPr lang="en-US" dirty="0"/>
           </a:p>
@@ -8393,7 +8255,7 @@
           <a:p>
             <a:fld id="{E7884882-FB12-4BC8-9960-9AD8104D7FAE}" type="datetimeFigureOut">
               <a:rPr lang="en-US" smtClean="0"/>
-              <a:t>6/20/2018</a:t>
+              <a:t>12/3/2018</a:t>
             </a:fld>
             <a:endParaRPr lang="en-US" dirty="0"/>
           </a:p>
@@ -8675,7 +8537,7 @@
           <a:p>
             <a:fld id="{F7D1BD23-6E54-4D9D-AD88-A2813C73CC25}" type="datetimeFigureOut">
               <a:rPr lang="en-US" smtClean="0"/>
-              <a:t>6/20/2018</a:t>
+              <a:t>12/3/2018</a:t>
             </a:fld>
             <a:endParaRPr lang="en-US" dirty="0"/>
           </a:p>
@@ -8933,7 +8795,7 @@
           <a:p>
             <a:fld id="{1471A834-4F3C-4AF9-9C74-05EC35A0F292}" type="datetimeFigureOut">
               <a:rPr lang="en-US" smtClean="0"/>
-              <a:t>6/20/2018</a:t>
+              <a:t>12/3/2018</a:t>
             </a:fld>
             <a:endParaRPr lang="en-US" dirty="0"/>
           </a:p>
@@ -9151,7 +9013,7 @@
           <a:p>
             <a:fld id="{51CF1133-3259-4C45-BABA-5B62D9C6F78D}" type="datetimeFigureOut">
               <a:rPr lang="en-US" smtClean="0"/>
-              <a:t>6/20/2018</a:t>
+              <a:t>12/3/2018</a:t>
             </a:fld>
             <a:endParaRPr lang="en-US" dirty="0"/>
           </a:p>
@@ -9725,7 +9587,33 @@
             </a:pPr>
             <a:r>
               <a:rPr lang="en-US" dirty="0" smtClean="0"/>
-              <a:t>Basic idea is to re-run clipping and only call SAT if it fails</a:t>
+              <a:t>Basic </a:t>
+            </a:r>
+            <a:r>
+              <a:rPr lang="en-US" dirty="0" smtClean="0"/>
+              <a:t>idea:</a:t>
+            </a:r>
+          </a:p>
+          <a:p>
+            <a:pPr marL="457200" lvl="1" indent="0">
+              <a:buNone/>
+            </a:pPr>
+            <a:r>
+              <a:rPr lang="en-US" dirty="0" smtClean="0"/>
+              <a:t>If relative orientation is the same, </a:t>
+            </a:r>
+            <a:r>
+              <a:rPr lang="en-US" dirty="0" smtClean="0"/>
+              <a:t>re-run clipping</a:t>
+            </a:r>
+          </a:p>
+          <a:p>
+            <a:pPr marL="457200" lvl="1" indent="0">
+              <a:buNone/>
+            </a:pPr>
+            <a:r>
+              <a:rPr lang="en-US" dirty="0" smtClean="0"/>
+              <a:t>Only fall back on SAT if axis separates or clipping fails</a:t>
             </a:r>
             <a:endParaRPr lang="en-US" dirty="0"/>
           </a:p>
@@ -12268,13 +12156,8 @@
             </a:pPr>
             <a:r>
               <a:rPr lang="en-US" dirty="0" smtClean="0"/>
-              <a:t>What’s the easiest way to write point vs. </a:t>
-            </a:r>
-            <a:r>
-              <a:rPr lang="en-US" dirty="0" smtClean="0"/>
-              <a:t>convex mesh?</a:t>
-            </a:r>
-            <a:endParaRPr lang="en-US" dirty="0" smtClean="0"/>
+              <a:t>What’s the easiest way to write point vs. convex mesh?</a:t>
+            </a:r>
           </a:p>
         </p:txBody>
       </p:sp>
@@ -12362,7 +12245,6 @@
               <a:rPr lang="en-US" dirty="0" smtClean="0"/>
               <a:t>	</a:t>
             </a:r>
-            <a:endParaRPr lang="en-US" dirty="0" smtClean="0"/>
           </a:p>
           <a:p>
             <a:pPr marL="0" indent="0">
@@ -12400,13 +12282,8 @@
             </a:pPr>
             <a:r>
               <a:rPr lang="en-US" dirty="0" smtClean="0"/>
-              <a:t>Sound familiar</a:t>
-            </a:r>
-            <a:r>
-              <a:rPr lang="en-US" dirty="0" smtClean="0"/>
-              <a:t>? This is an SAT test!</a:t>
-            </a:r>
-            <a:endParaRPr lang="en-US" dirty="0" smtClean="0"/>
+              <a:t>Sound familiar? This is an SAT test!</a:t>
+            </a:r>
           </a:p>
         </p:txBody>
       </p:sp>
@@ -12421,7 +12298,7 @@
         <p:spPr bwMode="auto">
           <a:xfrm>
             <a:off x="1689957" y="2402348"/>
-            <a:ext cx="6959772" cy="2031325"/>
+            <a:ext cx="6959772" cy="2246769"/>
           </a:xfrm>
           <a:prstGeom prst="rect">
             <a:avLst/>
@@ -12655,8 +12532,61 @@
                 </a:solidFill>
                 <a:latin typeface="Consolas" panose="020B0609020204030204" pitchFamily="49" charset="0"/>
               </a:rPr>
-              <a:t>  {</a:t>
-            </a:r>
+              <a:t>  </a:t>
+            </a:r>
+            <a:r>
+              <a:rPr lang="en-US" sz="1400" dirty="0" smtClean="0">
+                <a:solidFill>
+                  <a:srgbClr val="000000"/>
+                </a:solidFill>
+                <a:latin typeface="Consolas" panose="020B0609020204030204" pitchFamily="49" charset="0"/>
+              </a:rPr>
+              <a:t>{</a:t>
+            </a:r>
+          </a:p>
+          <a:p>
+            <a:r>
+              <a:rPr lang="en-US" sz="1400" dirty="0">
+                <a:solidFill>
+                  <a:srgbClr val="000000"/>
+                </a:solidFill>
+                <a:latin typeface="Consolas" panose="020B0609020204030204" pitchFamily="49" charset="0"/>
+              </a:rPr>
+              <a:t> </a:t>
+            </a:r>
+            <a:r>
+              <a:rPr lang="en-US" sz="1400" dirty="0" smtClean="0">
+                <a:solidFill>
+                  <a:srgbClr val="000000"/>
+                </a:solidFill>
+                <a:latin typeface="Consolas" panose="020B0609020204030204" pitchFamily="49" charset="0"/>
+              </a:rPr>
+              <a:t>   </a:t>
+            </a:r>
+            <a:r>
+              <a:rPr lang="en-US" sz="1400" dirty="0">
+                <a:solidFill>
+                  <a:srgbClr val="008000"/>
+                </a:solidFill>
+                <a:latin typeface="Consolas" panose="020B0609020204030204" pitchFamily="49" charset="0"/>
+              </a:rPr>
+              <a:t>// </a:t>
+            </a:r>
+            <a:r>
+              <a:rPr lang="en-US" sz="1400" dirty="0" smtClean="0">
+                <a:solidFill>
+                  <a:srgbClr val="008000"/>
+                </a:solidFill>
+                <a:latin typeface="Consolas" panose="020B0609020204030204" pitchFamily="49" charset="0"/>
+              </a:rPr>
+              <a:t>If outside the mesh (positive side of plane is outside)</a:t>
+            </a:r>
+            <a:endParaRPr lang="en-US" sz="1400" dirty="0">
+              <a:solidFill>
+                <a:srgbClr val="000000"/>
+              </a:solidFill>
+              <a:latin typeface="Consolas" panose="020B0609020204030204" pitchFamily="49" charset="0"/>
+            </a:endParaRPr>
           </a:p>
           <a:p>
             <a:r>
@@ -12702,7 +12632,34 @@
                 </a:solidFill>
                 <a:latin typeface="Consolas" panose="020B0609020204030204" pitchFamily="49" charset="0"/>
               </a:rPr>
-              <a:t>(point, face) == </a:t>
+              <a:t>(point, </a:t>
+            </a:r>
+            <a:r>
+              <a:rPr lang="en-US" sz="1400" dirty="0" err="1" smtClean="0">
+                <a:solidFill>
+                  <a:srgbClr val="000000"/>
+                </a:solidFill>
+                <a:latin typeface="Consolas" panose="020B0609020204030204" pitchFamily="49" charset="0"/>
+              </a:rPr>
+              <a:t>face.mPlane</a:t>
+            </a:r>
+            <a:r>
+              <a:rPr lang="en-US" sz="1400" dirty="0" smtClean="0">
+                <a:solidFill>
+                  <a:srgbClr val="000000"/>
+                </a:solidFill>
+                <a:latin typeface="Consolas" panose="020B0609020204030204" pitchFamily="49" charset="0"/>
+              </a:rPr>
+              <a:t>) </a:t>
+            </a:r>
+            <a:r>
+              <a:rPr lang="en-US" sz="1400" dirty="0">
+                <a:solidFill>
+                  <a:srgbClr val="000000"/>
+                </a:solidFill>
+                <a:latin typeface="Consolas" panose="020B0609020204030204" pitchFamily="49" charset="0"/>
+              </a:rPr>
+              <a:t>== </a:t>
             </a:r>
             <a:r>
               <a:rPr lang="en-US" sz="1400" dirty="0" err="1">
@@ -12714,7 +12671,7 @@
               <a:t>IntersectionType</a:t>
             </a:r>
             <a:r>
-              <a:rPr lang="en-US" sz="1400" dirty="0">
+              <a:rPr lang="en-US" sz="1400" dirty="0" smtClean="0">
                 <a:solidFill>
                   <a:srgbClr val="000000"/>
                 </a:solidFill>
@@ -12722,6 +12679,12 @@
               </a:rPr>
               <a:t>::Inside)</a:t>
             </a:r>
+            <a:endParaRPr lang="en-US" sz="1400" dirty="0">
+              <a:solidFill>
+                <a:srgbClr val="000000"/>
+              </a:solidFill>
+              <a:latin typeface="Consolas" panose="020B0609020204030204" pitchFamily="49" charset="0"/>
+            </a:endParaRPr>
           </a:p>
           <a:p>
             <a:r>
@@ -13340,15 +13303,7 @@
             </a:pPr>
             <a:r>
               <a:rPr lang="en-US" dirty="0" smtClean="0"/>
-              <a:t>Some faces come from </a:t>
-            </a:r>
-            <a:r>
-              <a:rPr lang="en-US" dirty="0" smtClean="0"/>
-              <a:t>the object </a:t>
-            </a:r>
-            <a:r>
-              <a:rPr lang="en-US" dirty="0" smtClean="0"/>
-              <a:t>faces</a:t>
+              <a:t>Some faces come from the object faces</a:t>
             </a:r>
           </a:p>
           <a:p>
@@ -13491,11 +13446,7 @@
             </a:pPr>
             <a:r>
               <a:rPr lang="en-US" dirty="0" smtClean="0"/>
-              <a:t>Where </a:t>
-            </a:r>
-            <a:r>
-              <a:rPr lang="en-US" dirty="0" smtClean="0"/>
-              <a:t>do these extra faces come from?</a:t>
+              <a:t>Where do these extra faces come from?</a:t>
             </a:r>
           </a:p>
           <a:p>
@@ -14225,7 +14176,6 @@
               <a:rPr lang="en-US" dirty="0" smtClean="0"/>
               <a:t>Face normal is the cross product of the two edges!</a:t>
             </a:r>
-            <a:endParaRPr lang="en-US" dirty="0" smtClean="0"/>
           </a:p>
         </p:txBody>
       </p:sp>
@@ -14673,7 +14623,6 @@
               <a:rPr lang="en-US" dirty="0" smtClean="0"/>
               <a:t>What happened to the other 126 edge faces?</a:t>
             </a:r>
-            <a:endParaRPr lang="en-US" dirty="0" smtClean="0"/>
           </a:p>
         </p:txBody>
       </p:sp>
@@ -15673,15 +15622,7 @@
             </a:pPr>
             <a:r>
               <a:rPr lang="en-US" dirty="0" smtClean="0"/>
-              <a:t>Only </a:t>
-            </a:r>
-            <a:r>
-              <a:rPr lang="en-US" dirty="0" smtClean="0"/>
-              <a:t>edges that produce a face on the Minkowski difference’s surface </a:t>
-            </a:r>
-            <a:r>
-              <a:rPr lang="en-US" dirty="0" smtClean="0"/>
-              <a:t>need to be tested!</a:t>
+              <a:t>Only edges that produce a face on the Minkowski difference’s surface need to be tested!</a:t>
             </a:r>
             <a:endParaRPr lang="en-US" dirty="0"/>
           </a:p>
@@ -16109,8 +16050,8 @@
           </a:p>
         </p:txBody>
       </p:sp>
-      <mc:AlternateContent xmlns:mc="http://schemas.openxmlformats.org/markup-compatibility/2006">
-        <mc:Choice xmlns:a14="http://schemas.microsoft.com/office/drawing/2010/main" Requires="a14">
+      <mc:AlternateContent xmlns:mc="http://schemas.openxmlformats.org/markup-compatibility/2006" xmlns:a14="http://schemas.microsoft.com/office/drawing/2010/main">
+        <mc:Choice Requires="a14">
           <p:sp>
             <p:nvSpPr>
               <p:cNvPr id="3" name="Content Placeholder 2"/>
@@ -16163,7 +16104,6 @@
                   <a:rPr lang="en-US" dirty="0" smtClean="0"/>
                   <a:t>Point</a:t>
                 </a:r>
-                <a:endParaRPr lang="en-US" dirty="0" smtClean="0"/>
               </a:p>
               <a:p>
                 <a:pPr marL="0" indent="0">
@@ -16185,18 +16125,13 @@
                 </a14:m>
                 <a:r>
                   <a:rPr lang="en-US" dirty="0" smtClean="0"/>
-                  <a:t>Great </a:t>
+                  <a:t>Great arc</a:t>
                 </a:r>
-                <a:r>
-                  <a:rPr lang="en-US" dirty="0" smtClean="0"/>
-                  <a:t>arc</a:t>
-                </a:r>
-                <a:endParaRPr lang="en-US" dirty="0" smtClean="0"/>
               </a:p>
             </p:txBody>
           </p:sp>
         </mc:Choice>
-        <mc:Fallback>
+        <mc:Fallback xmlns="">
           <p:sp>
             <p:nvSpPr>
               <p:cNvPr id="3" name="Content Placeholder 2"/>
@@ -16450,11 +16385,7 @@
             </a:pPr>
             <a:r>
               <a:rPr lang="en-US" dirty="0" smtClean="0"/>
-              <a:t>Why </a:t>
-            </a:r>
-            <a:r>
-              <a:rPr lang="en-US" dirty="0" smtClean="0"/>
-              <a:t>does this matter?</a:t>
+              <a:t>Why does this matter?</a:t>
             </a:r>
             <a:endParaRPr lang="en-US" dirty="0"/>
           </a:p>
@@ -21444,7 +21375,15 @@
             </a:pPr>
             <a:r>
               <a:rPr lang="en-US" b="0" dirty="0" smtClean="0"/>
-              <a:t>Total test is three scalar triple products:</a:t>
+              <a:t>Total test is </a:t>
+            </a:r>
+            <a:r>
+              <a:rPr lang="en-US" b="0" dirty="0" smtClean="0"/>
+              <a:t>four scalar </a:t>
+            </a:r>
+            <a:r>
+              <a:rPr lang="en-US" b="0" dirty="0" smtClean="0"/>
+              <a:t>triple products:</a:t>
             </a:r>
             <a:endParaRPr lang="en-US" dirty="0" smtClean="0"/>
           </a:p>
@@ -25481,11 +25420,7 @@
           <a:p>
             <a:r>
               <a:rPr lang="en-US" dirty="0" smtClean="0"/>
-              <a:t>Gauss Maps </a:t>
-            </a:r>
-            <a:r>
-              <a:rPr lang="en-US" dirty="0" smtClean="0"/>
-              <a:t>– Removing Cross Products</a:t>
+              <a:t>Gauss Maps – Removing Cross Products</a:t>
             </a:r>
             <a:endParaRPr lang="en-US" dirty="0"/>
           </a:p>
@@ -25528,8 +25463,8 @@
           </a:p>
         </p:txBody>
       </p:sp>
-      <mc:AlternateContent xmlns:mc="http://schemas.openxmlformats.org/markup-compatibility/2006">
-        <mc:Choice xmlns:a14="http://schemas.microsoft.com/office/drawing/2010/main" Requires="a14">
+      <mc:AlternateContent xmlns:mc="http://schemas.openxmlformats.org/markup-compatibility/2006" xmlns:a14="http://schemas.microsoft.com/office/drawing/2010/main">
+        <mc:Choice Requires="a14">
           <p:sp>
             <p:nvSpPr>
               <p:cNvPr id="12" name="Content Placeholder 2"/>
@@ -25799,7 +25734,7 @@
             </p:txBody>
           </p:sp>
         </mc:Choice>
-        <mc:Fallback>
+        <mc:Fallback xmlns="">
           <p:sp>
             <p:nvSpPr>
               <p:cNvPr id="12" name="Content Placeholder 2"/>
@@ -26073,8 +26008,8 @@
             </a:prstGeom>
           </p:spPr>
         </p:pic>
-        <mc:AlternateContent xmlns:mc="http://schemas.openxmlformats.org/markup-compatibility/2006">
-          <mc:Choice xmlns:a14="http://schemas.microsoft.com/office/drawing/2010/main" Requires="a14">
+        <mc:AlternateContent xmlns:mc="http://schemas.openxmlformats.org/markup-compatibility/2006" xmlns:a14="http://schemas.microsoft.com/office/drawing/2010/main">
+          <mc:Choice Requires="a14">
             <p:sp>
               <p:nvSpPr>
                 <p:cNvPr id="11" name="Content Placeholder 2"/>
@@ -26296,7 +26231,7 @@
               </p:txBody>
             </p:sp>
           </mc:Choice>
-          <mc:Fallback>
+          <mc:Fallback xmlns="">
             <p:sp>
               <p:nvSpPr>
                 <p:cNvPr id="11" name="Content Placeholder 2"/>
@@ -26335,8 +26270,8 @@
             </p:sp>
           </mc:Fallback>
         </mc:AlternateContent>
-        <mc:AlternateContent xmlns:mc="http://schemas.openxmlformats.org/markup-compatibility/2006">
-          <mc:Choice xmlns:a14="http://schemas.microsoft.com/office/drawing/2010/main" Requires="a14">
+        <mc:AlternateContent xmlns:mc="http://schemas.openxmlformats.org/markup-compatibility/2006" xmlns:a14="http://schemas.microsoft.com/office/drawing/2010/main">
+          <mc:Choice Requires="a14">
             <p:sp>
               <p:nvSpPr>
                 <p:cNvPr id="23" name="Content Placeholder 2"/>
@@ -26558,7 +26493,7 @@
               </p:txBody>
             </p:sp>
           </mc:Choice>
-          <mc:Fallback>
+          <mc:Fallback xmlns="">
             <p:sp>
               <p:nvSpPr>
                 <p:cNvPr id="23" name="Content Placeholder 2"/>
@@ -26597,8 +26532,8 @@
             </p:sp>
           </mc:Fallback>
         </mc:AlternateContent>
-        <mc:AlternateContent xmlns:mc="http://schemas.openxmlformats.org/markup-compatibility/2006">
-          <mc:Choice xmlns:a14="http://schemas.microsoft.com/office/drawing/2010/main" Requires="a14">
+        <mc:AlternateContent xmlns:mc="http://schemas.openxmlformats.org/markup-compatibility/2006" xmlns:a14="http://schemas.microsoft.com/office/drawing/2010/main">
+          <mc:Choice Requires="a14">
             <p:sp>
               <p:nvSpPr>
                 <p:cNvPr id="24" name="Content Placeholder 2"/>
@@ -26820,7 +26755,7 @@
               </p:txBody>
             </p:sp>
           </mc:Choice>
-          <mc:Fallback>
+          <mc:Fallback xmlns="">
             <p:sp>
               <p:nvSpPr>
                 <p:cNvPr id="24" name="Content Placeholder 2"/>
@@ -27051,15 +26986,7 @@
             </a:pPr>
             <a:r>
               <a:rPr lang="en-US" dirty="0" smtClean="0"/>
-              <a:t>*Makes test also work with double </a:t>
-            </a:r>
-            <a:r>
-              <a:rPr lang="en-US" dirty="0" smtClean="0"/>
-              <a:t>sided </a:t>
-            </a:r>
-            <a:r>
-              <a:rPr lang="en-US" dirty="0" smtClean="0"/>
-              <a:t>triangles</a:t>
+              <a:t>*Makes test also work with double sided triangles</a:t>
             </a:r>
             <a:endParaRPr lang="en-US" dirty="0"/>
           </a:p>

</xml_diff>